<commit_message>
Applied updated color palette to 02_variables.pptx.
</commit_message>
<xml_diff>
--- a/presentations/02_variables.pptx
+++ b/presentations/02_variables.pptx
@@ -232,7 +232,7 @@
           <a:p>
             <a:fld id="{FD93C9B2-20F6-4DB1-B471-224337D0AC79}" type="datetimeFigureOut">
               <a:rPr lang="en-US" smtClean="0"/>
-              <a:t>12/6/2022</a:t>
+              <a:t>1/12/2023</a:t>
             </a:fld>
             <a:endParaRPr lang="en-US"/>
           </a:p>
@@ -2792,7 +2792,7 @@
           <a:p>
             <a:fld id="{C3F78080-8D0A-4BE8-A5B4-CB115102D524}" type="datetimeFigureOut">
               <a:rPr lang="en-US" smtClean="0"/>
-              <a:t>12/6/2022</a:t>
+              <a:t>1/12/2023</a:t>
             </a:fld>
             <a:endParaRPr lang="en-US"/>
           </a:p>
@@ -2990,7 +2990,7 @@
           <a:p>
             <a:fld id="{C3F78080-8D0A-4BE8-A5B4-CB115102D524}" type="datetimeFigureOut">
               <a:rPr lang="en-US" smtClean="0"/>
-              <a:t>12/6/2022</a:t>
+              <a:t>1/12/2023</a:t>
             </a:fld>
             <a:endParaRPr lang="en-US"/>
           </a:p>
@@ -3198,7 +3198,7 @@
           <a:p>
             <a:fld id="{C3F78080-8D0A-4BE8-A5B4-CB115102D524}" type="datetimeFigureOut">
               <a:rPr lang="en-US" smtClean="0"/>
-              <a:t>12/6/2022</a:t>
+              <a:t>1/12/2023</a:t>
             </a:fld>
             <a:endParaRPr lang="en-US"/>
           </a:p>
@@ -3396,7 +3396,7 @@
           <a:p>
             <a:fld id="{C3F78080-8D0A-4BE8-A5B4-CB115102D524}" type="datetimeFigureOut">
               <a:rPr lang="en-US" smtClean="0"/>
-              <a:t>12/6/2022</a:t>
+              <a:t>1/12/2023</a:t>
             </a:fld>
             <a:endParaRPr lang="en-US"/>
           </a:p>
@@ -3671,7 +3671,7 @@
           <a:p>
             <a:fld id="{C3F78080-8D0A-4BE8-A5B4-CB115102D524}" type="datetimeFigureOut">
               <a:rPr lang="en-US" smtClean="0"/>
-              <a:t>12/6/2022</a:t>
+              <a:t>1/12/2023</a:t>
             </a:fld>
             <a:endParaRPr lang="en-US"/>
           </a:p>
@@ -3936,7 +3936,7 @@
           <a:p>
             <a:fld id="{C3F78080-8D0A-4BE8-A5B4-CB115102D524}" type="datetimeFigureOut">
               <a:rPr lang="en-US" smtClean="0"/>
-              <a:t>12/6/2022</a:t>
+              <a:t>1/12/2023</a:t>
             </a:fld>
             <a:endParaRPr lang="en-US"/>
           </a:p>
@@ -4348,7 +4348,7 @@
           <a:p>
             <a:fld id="{C3F78080-8D0A-4BE8-A5B4-CB115102D524}" type="datetimeFigureOut">
               <a:rPr lang="en-US" smtClean="0"/>
-              <a:t>12/6/2022</a:t>
+              <a:t>1/12/2023</a:t>
             </a:fld>
             <a:endParaRPr lang="en-US"/>
           </a:p>
@@ -4489,7 +4489,7 @@
           <a:p>
             <a:fld id="{C3F78080-8D0A-4BE8-A5B4-CB115102D524}" type="datetimeFigureOut">
               <a:rPr lang="en-US" smtClean="0"/>
-              <a:t>12/6/2022</a:t>
+              <a:t>1/12/2023</a:t>
             </a:fld>
             <a:endParaRPr lang="en-US"/>
           </a:p>
@@ -4602,7 +4602,7 @@
           <a:p>
             <a:fld id="{C3F78080-8D0A-4BE8-A5B4-CB115102D524}" type="datetimeFigureOut">
               <a:rPr lang="en-US" smtClean="0"/>
-              <a:t>12/6/2022</a:t>
+              <a:t>1/12/2023</a:t>
             </a:fld>
             <a:endParaRPr lang="en-US"/>
           </a:p>
@@ -4913,7 +4913,7 @@
           <a:p>
             <a:fld id="{C3F78080-8D0A-4BE8-A5B4-CB115102D524}" type="datetimeFigureOut">
               <a:rPr lang="en-US" smtClean="0"/>
-              <a:t>12/6/2022</a:t>
+              <a:t>1/12/2023</a:t>
             </a:fld>
             <a:endParaRPr lang="en-US"/>
           </a:p>
@@ -5201,7 +5201,7 @@
           <a:p>
             <a:fld id="{C3F78080-8D0A-4BE8-A5B4-CB115102D524}" type="datetimeFigureOut">
               <a:rPr lang="en-US" smtClean="0"/>
-              <a:t>12/6/2022</a:t>
+              <a:t>1/12/2023</a:t>
             </a:fld>
             <a:endParaRPr lang="en-US"/>
           </a:p>
@@ -5442,7 +5442,7 @@
           <a:p>
             <a:fld id="{C3F78080-8D0A-4BE8-A5B4-CB115102D524}" type="datetimeFigureOut">
               <a:rPr lang="en-US" smtClean="0"/>
-              <a:t>12/6/2022</a:t>
+              <a:t>1/12/2023</a:t>
             </a:fld>
             <a:endParaRPr lang="en-US"/>
           </a:p>
@@ -6090,7 +6090,7 @@
             <a:r>
               <a:rPr lang="en-US" dirty="0">
                 <a:solidFill>
-                  <a:srgbClr val="65BB7B"/>
+                  <a:srgbClr val="5A5AA8"/>
                 </a:solidFill>
                 <a:latin typeface="Avenir" panose="02000503020000020003" pitchFamily="2" charset="0"/>
               </a:rPr>
@@ -6105,7 +6105,7 @@
             <a:r>
               <a:rPr lang="en-US" dirty="0">
                 <a:solidFill>
-                  <a:srgbClr val="65BB7B"/>
+                  <a:srgbClr val="5A5AA8"/>
                 </a:solidFill>
                 <a:latin typeface="Avenir" panose="02000503020000020003" pitchFamily="2" charset="0"/>
               </a:rPr>
@@ -6120,7 +6120,7 @@
             <a:r>
               <a:rPr lang="en-US" dirty="0">
                 <a:solidFill>
-                  <a:srgbClr val="65BB7B"/>
+                  <a:srgbClr val="5A5AA8"/>
                 </a:solidFill>
                 <a:latin typeface="Avenir" panose="02000503020000020003" pitchFamily="2" charset="0"/>
               </a:rPr>
@@ -6399,7 +6399,7 @@
               <a:rPr lang="en-US" dirty="0">
                 <a:latin typeface="Avenir" panose="02000503020000020003" pitchFamily="2" charset="0"/>
               </a:rPr>
-              <a:t>  Not Equal to  			           </a:t>
+              <a:t>  Not Equal to  			</a:t>
             </a:r>
             <a:r>
               <a:rPr lang="en-US" b="1" dirty="0">
@@ -7372,7 +7372,7 @@
             <a:r>
               <a:rPr lang="en-US" dirty="0">
                 <a:solidFill>
-                  <a:srgbClr val="65BB7B"/>
+                  <a:srgbClr val="5A5AA8"/>
                 </a:solidFill>
                 <a:latin typeface="Avenir Medium" panose="02000503020000020003" pitchFamily="2" charset="0"/>
               </a:rPr>
@@ -7387,7 +7387,7 @@
             <a:r>
               <a:rPr lang="en-US" dirty="0">
                 <a:solidFill>
-                  <a:srgbClr val="65BB7B"/>
+                  <a:srgbClr val="5A5AA8"/>
                 </a:solidFill>
                 <a:latin typeface="Avenir Medium" panose="02000503020000020003" pitchFamily="2" charset="0"/>
               </a:rPr>
@@ -7402,7 +7402,7 @@
             <a:r>
               <a:rPr lang="en-US" dirty="0">
                 <a:solidFill>
-                  <a:srgbClr val="65BB7B"/>
+                  <a:srgbClr val="5A5AA8"/>
                 </a:solidFill>
                 <a:latin typeface="Avenir" panose="02000503020000020003" pitchFamily="2" charset="0"/>
               </a:rPr>
@@ -7428,7 +7428,7 @@
             <a:r>
               <a:rPr lang="en-US" dirty="0">
                 <a:solidFill>
-                  <a:srgbClr val="65BB7B"/>
+                  <a:srgbClr val="5A5AA8"/>
                 </a:solidFill>
                 <a:latin typeface="Avenir Medium" panose="02000503020000020003" pitchFamily="2" charset="0"/>
               </a:rPr>
@@ -7443,7 +7443,7 @@
             <a:r>
               <a:rPr lang="en-US" dirty="0">
                 <a:solidFill>
-                  <a:srgbClr val="65BB7B"/>
+                  <a:srgbClr val="5A5AA8"/>
                 </a:solidFill>
                 <a:latin typeface="Avenir Medium" panose="02000503020000020003" pitchFamily="2" charset="0"/>
               </a:rPr>
@@ -7458,7 +7458,7 @@
             <a:r>
               <a:rPr lang="en-US" dirty="0">
                 <a:solidFill>
-                  <a:srgbClr val="65BB7B"/>
+                  <a:srgbClr val="5A5AA8"/>
                 </a:solidFill>
                 <a:latin typeface="Avenir" panose="02000503020000020003" pitchFamily="2" charset="0"/>
               </a:rPr>
@@ -7475,20 +7475,11 @@
             <a:r>
               <a:rPr lang="en-US" dirty="0">
                 <a:solidFill>
-                  <a:srgbClr val="65BB7B"/>
-                </a:solidFill>
-                <a:latin typeface="Avenir Medium" panose="02000503020000020003" pitchFamily="2" charset="0"/>
-              </a:rPr>
-              <a:t>not</a:t>
-            </a:r>
-            <a:r>
-              <a:rPr lang="en-US" dirty="0">
-                <a:solidFill>
                   <a:srgbClr val="5A5AA8"/>
                 </a:solidFill>
                 <a:latin typeface="Avenir Medium" panose="02000503020000020003" pitchFamily="2" charset="0"/>
               </a:rPr>
-              <a:t> </a:t>
+              <a:t>not </a:t>
             </a:r>
             <a:r>
               <a:rPr lang="en-US" dirty="0">
@@ -7534,16 +7525,16 @@
                 </a:solidFill>
                 <a:latin typeface="Avenir Medium" panose="02000503020000020003" pitchFamily="2" charset="0"/>
               </a:rPr>
-              <a:t>  </a:t>
+              <a:t>  is</a:t>
             </a:r>
             <a:r>
               <a:rPr lang="en-US" dirty="0">
                 <a:solidFill>
-                  <a:srgbClr val="65BB7B"/>
+                  <a:srgbClr val="5A5AA8"/>
                 </a:solidFill>
-                <a:latin typeface="Avenir Medium" panose="02000503020000020003" pitchFamily="2" charset="0"/>
+                <a:latin typeface="Avenir" panose="02000503020000020003" pitchFamily="2" charset="0"/>
               </a:rPr>
-              <a:t>is</a:t>
+              <a:t> </a:t>
             </a:r>
             <a:r>
               <a:rPr lang="en-US" dirty="0">
@@ -7554,7 +7545,7 @@
                 </a:solidFill>
                 <a:latin typeface="Avenir" panose="02000503020000020003" pitchFamily="2" charset="0"/>
               </a:rPr>
-              <a:t>      </a:t>
+              <a:t>     </a:t>
             </a:r>
             <a:r>
               <a:rPr lang="en-US" dirty="0">
@@ -7565,7 +7556,7 @@
             <a:r>
               <a:rPr lang="en-US" dirty="0">
                 <a:solidFill>
-                  <a:srgbClr val="65BB7B"/>
+                  <a:srgbClr val="5A5AA8"/>
                 </a:solidFill>
                 <a:latin typeface="Avenir" panose="02000503020000020003" pitchFamily="2" charset="0"/>
               </a:rPr>
@@ -7582,7 +7573,7 @@
             <a:r>
               <a:rPr lang="en-US" dirty="0">
                 <a:solidFill>
-                  <a:srgbClr val="65BB7B"/>
+                  <a:srgbClr val="5A5AA8"/>
                 </a:solidFill>
                 <a:latin typeface="Avenir Medium" panose="02000503020000020003" pitchFamily="2" charset="0"/>
               </a:rPr>
@@ -7600,7 +7591,7 @@
             <a:r>
               <a:rPr lang="en-US" dirty="0">
                 <a:solidFill>
-                  <a:srgbClr val="65BB7B"/>
+                  <a:srgbClr val="5A5AA8"/>
                 </a:solidFill>
                 <a:latin typeface="Avenir" panose="02000503020000020003" pitchFamily="2" charset="0"/>
               </a:rPr>
@@ -7659,42 +7650,22 @@
                 </a:solidFill>
                 <a:latin typeface="Avenir Medium" panose="02000503020000020003" pitchFamily="2" charset="0"/>
               </a:rPr>
-              <a:t>  </a:t>
+              <a:t>  in</a:t>
             </a:r>
             <a:r>
               <a:rPr lang="en-US" dirty="0">
                 <a:solidFill>
-                  <a:srgbClr val="65BB7B"/>
-                </a:solidFill>
-                <a:latin typeface="Avenir Medium" panose="02000503020000020003" pitchFamily="2" charset="0"/>
-              </a:rPr>
-              <a:t>in</a:t>
-            </a:r>
-            <a:r>
-              <a:rPr lang="en-US" dirty="0">
-                <a:solidFill>
-                  <a:srgbClr val="65BB7B"/>
+                  <a:srgbClr val="5A5AA8"/>
                 </a:solidFill>
                 <a:latin typeface="Avenir" panose="02000503020000020003" pitchFamily="2" charset="0"/>
               </a:rPr>
-              <a:t> </a:t>
-            </a:r>
-            <a:r>
-              <a:rPr lang="en-US" dirty="0">
-                <a:solidFill>
-                  <a:schemeClr val="accent5">
-                    <a:lumMod val="75000"/>
-                  </a:schemeClr>
-                </a:solidFill>
-                <a:latin typeface="Avenir" panose="02000503020000020003" pitchFamily="2" charset="0"/>
-              </a:rPr>
-              <a:t> </a:t>
+              <a:t>   </a:t>
             </a:r>
             <a:r>
               <a:rPr lang="en-US" dirty="0">
                 <a:latin typeface="Avenir" panose="02000503020000020003" pitchFamily="2" charset="0"/>
               </a:rPr>
-              <a:t>     </a:t>
+              <a:t>    </a:t>
             </a:r>
             <a:r>
               <a:rPr lang="en-US" dirty="0">
@@ -7708,7 +7679,7 @@
             <a:r>
               <a:rPr lang="en-US" dirty="0">
                 <a:solidFill>
-                  <a:srgbClr val="65BB7B"/>
+                  <a:srgbClr val="5A5AA8"/>
                 </a:solidFill>
                 <a:latin typeface="Avenir" panose="02000503020000020003" pitchFamily="2" charset="0"/>
               </a:rPr>
@@ -7725,7 +7696,7 @@
             <a:r>
               <a:rPr lang="en-US" dirty="0">
                 <a:solidFill>
-                  <a:srgbClr val="65BB7B"/>
+                  <a:srgbClr val="5A5AA8"/>
                 </a:solidFill>
                 <a:latin typeface="Avenir Medium" panose="02000503020000020003" pitchFamily="2" charset="0"/>
               </a:rPr>
@@ -7743,7 +7714,7 @@
             <a:r>
               <a:rPr lang="en-US" dirty="0">
                 <a:solidFill>
-                  <a:srgbClr val="65BB7B"/>
+                  <a:srgbClr val="5A5AA8"/>
                 </a:solidFill>
                 <a:latin typeface="Avenir" panose="02000503020000020003" pitchFamily="2" charset="0"/>
               </a:rPr>
@@ -8946,7 +8917,25 @@
                 </a:solidFill>
                 <a:latin typeface="Avenir" panose="02000503020000020003" pitchFamily="2" charset="0"/>
               </a:rPr>
-              <a:t> one </a:t>
+              <a:t> </a:t>
+            </a:r>
+            <a:r>
+              <a:rPr lang="en-US" dirty="0">
+                <a:solidFill>
+                  <a:srgbClr val="5A5AA8"/>
+                </a:solidFill>
+                <a:latin typeface="Avenir" panose="02000503020000020003" pitchFamily="2" charset="0"/>
+              </a:rPr>
+              <a:t>one</a:t>
+            </a:r>
+            <a:r>
+              <a:rPr lang="en-US" dirty="0">
+                <a:solidFill>
+                  <a:srgbClr val="65BB7B"/>
+                </a:solidFill>
+                <a:latin typeface="Avenir" panose="02000503020000020003" pitchFamily="2" charset="0"/>
+              </a:rPr>
+              <a:t> </a:t>
             </a:r>
             <a:r>
               <a:rPr lang="en-US" dirty="0">
@@ -8957,7 +8946,7 @@
             <a:r>
               <a:rPr lang="en-US" dirty="0">
                 <a:solidFill>
-                  <a:srgbClr val="65BB7B"/>
+                  <a:srgbClr val="5A5AA8"/>
                 </a:solidFill>
                 <a:latin typeface="Avenir" panose="02000503020000020003" pitchFamily="2" charset="0"/>
               </a:rPr>
@@ -8985,7 +8974,7 @@
             <a:r>
               <a:rPr lang="en-US" dirty="0">
                 <a:solidFill>
-                  <a:srgbClr val="65BB7B"/>
+                  <a:srgbClr val="5A5AA8"/>
                 </a:solidFill>
                 <a:latin typeface="Avenir" panose="02000503020000020003" pitchFamily="2" charset="0"/>
               </a:rPr>
@@ -9017,7 +9006,7 @@
             <a:r>
               <a:rPr lang="en-US" dirty="0">
                 <a:solidFill>
-                  <a:srgbClr val="65BB7B"/>
+                  <a:srgbClr val="5A5AA8"/>
                 </a:solidFill>
                 <a:latin typeface="Avenir" panose="02000503020000020003" pitchFamily="2" charset="0"/>
               </a:rPr>
@@ -9032,7 +9021,7 @@
             <a:r>
               <a:rPr lang="en-US" dirty="0">
                 <a:solidFill>
-                  <a:srgbClr val="65BB7B"/>
+                  <a:srgbClr val="5A5AA8"/>
                 </a:solidFill>
                 <a:latin typeface="Avenir" panose="02000503020000020003" pitchFamily="2" charset="0"/>
               </a:rPr>
@@ -9047,7 +9036,7 @@
             <a:r>
               <a:rPr lang="en-US" dirty="0">
                 <a:solidFill>
-                  <a:srgbClr val="65BB7B"/>
+                  <a:srgbClr val="5A5AA8"/>
                 </a:solidFill>
                 <a:latin typeface="Avenir" panose="02000503020000020003" pitchFamily="2" charset="0"/>
               </a:rPr>
@@ -9069,7 +9058,7 @@
             <a:r>
               <a:rPr lang="en-US" dirty="0">
                 <a:solidFill>
-                  <a:srgbClr val="65BB7B"/>
+                  <a:srgbClr val="5A5AA8"/>
                 </a:solidFill>
                 <a:latin typeface="Avenir" panose="02000503020000020003" pitchFamily="2" charset="0"/>
               </a:rPr>
@@ -14137,7 +14126,7 @@
             <a:r>
               <a:rPr lang="en-US" dirty="0">
                 <a:solidFill>
-                  <a:srgbClr val="65BB7B"/>
+                  <a:srgbClr val="5A5AA8"/>
                 </a:solidFill>
               </a:rPr>
               <a:t>1+3j</a:t>
@@ -14180,7 +14169,7 @@
             <a:r>
               <a:rPr lang="en-US" dirty="0">
                 <a:solidFill>
-                  <a:srgbClr val="65BB7B"/>
+                  <a:srgbClr val="5A5AA8"/>
                 </a:solidFill>
               </a:rPr>
               <a:t>35.75</a:t>
@@ -14223,7 +14212,7 @@
             <a:r>
               <a:rPr lang="en-US" dirty="0">
                 <a:solidFill>
-                  <a:srgbClr val="65BB7B"/>
+                  <a:srgbClr val="5A5AA8"/>
                 </a:solidFill>
               </a:rPr>
               <a:t>20</a:t>
@@ -14266,7 +14255,7 @@
             <a:r>
               <a:rPr lang="en-US" dirty="0">
                 <a:solidFill>
-                  <a:srgbClr val="65BB7B"/>
+                  <a:srgbClr val="5A5AA8"/>
                 </a:solidFill>
               </a:rPr>
               <a:t>‘Jessa’</a:t>
@@ -14309,7 +14298,7 @@
             <a:r>
               <a:rPr lang="en-US" dirty="0">
                 <a:solidFill>
-                  <a:srgbClr val="65BB7B"/>
+                  <a:srgbClr val="5A5AA8"/>
                 </a:solidFill>
               </a:rPr>
               <a:t>[2, ’a’, 5.7]</a:t>
@@ -14352,7 +14341,7 @@
             <a:r>
               <a:rPr lang="en-US" dirty="0">
                 <a:solidFill>
-                  <a:srgbClr val="65BB7B"/>
+                  <a:srgbClr val="5A5AA8"/>
                 </a:solidFill>
               </a:rPr>
               <a:t>[3, 4.5, ‘b’]</a:t>
@@ -14395,7 +14384,7 @@
             <a:r>
               <a:rPr lang="en-US" dirty="0">
                 <a:solidFill>
-                  <a:srgbClr val="65BB7B"/>
+                  <a:srgbClr val="5A5AA8"/>
                 </a:solidFill>
               </a:rPr>
               <a:t>True, False </a:t>
@@ -14438,7 +14427,7 @@
             <a:r>
               <a:rPr lang="en-US" dirty="0">
                 <a:solidFill>
-                  <a:srgbClr val="65BB7B"/>
+                  <a:srgbClr val="5A5AA8"/>
                 </a:solidFill>
               </a:rPr>
               <a:t>{2, 4, 6} </a:t>
@@ -14481,7 +14470,7 @@
             <a:r>
               <a:rPr lang="en-US" dirty="0">
                 <a:solidFill>
-                  <a:srgbClr val="65BB7B"/>
+                  <a:srgbClr val="5A5AA8"/>
                 </a:solidFill>
               </a:rPr>
               <a:t>{1:’a, 2:’b’} </a:t>
@@ -16221,22 +16210,11 @@
             <a:r>
               <a:rPr lang="en-US" dirty="0">
                 <a:solidFill>
-                  <a:schemeClr val="accent5">
-                    <a:lumMod val="75000"/>
-                  </a:schemeClr>
+                  <a:srgbClr val="5A5AA8"/>
                 </a:solidFill>
                 <a:latin typeface="Avenir" panose="02000503020000020003" pitchFamily="2" charset="0"/>
               </a:rPr>
-              <a:t> </a:t>
-            </a:r>
-            <a:r>
-              <a:rPr lang="en-US" dirty="0">
-                <a:solidFill>
-                  <a:srgbClr val="65BB7B"/>
-                </a:solidFill>
-                <a:latin typeface="Avenir" panose="02000503020000020003" pitchFamily="2" charset="0"/>
-              </a:rPr>
-              <a:t>#</a:t>
+              <a:t> #</a:t>
             </a:r>
           </a:p>
           <a:p>
@@ -16261,7 +16239,16 @@
                 </a:solidFill>
                 <a:latin typeface="Avenir" panose="02000503020000020003" pitchFamily="2" charset="0"/>
               </a:rPr>
-              <a:t> &lt;</a:t>
+              <a:t> </a:t>
+            </a:r>
+            <a:r>
+              <a:rPr lang="en-US" dirty="0">
+                <a:solidFill>
+                  <a:srgbClr val="5A5AA8"/>
+                </a:solidFill>
+                <a:latin typeface="Avenir" panose="02000503020000020003" pitchFamily="2" charset="0"/>
+              </a:rPr>
+              <a:t>&lt;ctl-1</a:t>
             </a:r>
             <a:r>
               <a:rPr lang="en-US" dirty="0">
@@ -16272,7 +16259,7 @@
                 </a:solidFill>
                 <a:latin typeface="Avenir" panose="02000503020000020003" pitchFamily="2" charset="0"/>
               </a:rPr>
-              <a:t>ctl-1&gt;</a:t>
+              <a:t>&gt;</a:t>
             </a:r>
           </a:p>
           <a:p>
@@ -16368,7 +16355,7 @@
             <a:r>
               <a:rPr lang="en-US" dirty="0">
                 <a:solidFill>
-                  <a:srgbClr val="65BB7B"/>
+                  <a:srgbClr val="5A5AA8"/>
                 </a:solidFill>
                 <a:latin typeface="Avenir" panose="02000503020000020003" pitchFamily="2" charset="0"/>
               </a:rPr>
@@ -16435,7 +16422,7 @@
             <a:r>
               <a:rPr lang="en-US" dirty="0">
                 <a:solidFill>
-                  <a:srgbClr val="FFC000"/>
+                  <a:srgbClr val="5A5AA8"/>
                 </a:solidFill>
                 <a:latin typeface="Avenir" panose="02000503020000020003" pitchFamily="2" charset="0"/>
               </a:rPr>
@@ -16461,7 +16448,7 @@
             <a:r>
               <a:rPr lang="en-US" dirty="0">
                 <a:solidFill>
-                  <a:srgbClr val="FFC000"/>
+                  <a:srgbClr val="5A5AA8"/>
                 </a:solidFill>
                 <a:latin typeface="Avenir" panose="02000503020000020003" pitchFamily="2" charset="0"/>
               </a:rPr>
@@ -22334,17 +22321,17 @@
             <a:r>
               <a:rPr lang="en-US" sz="2400" dirty="0">
                 <a:solidFill>
-                  <a:srgbClr val="65BB7B"/>
+                  <a:srgbClr val="5A5AA8"/>
                 </a:solidFill>
                 <a:latin typeface="Avenir" panose="02000503020000020003" pitchFamily="2" charset="0"/>
               </a:rPr>
-              <a:t>dynamically</a:t>
+              <a:t>dynamically </a:t>
             </a:r>
             <a:r>
               <a:rPr lang="en-US" sz="2400" dirty="0">
                 <a:latin typeface="Avenir" panose="02000503020000020003" pitchFamily="2" charset="0"/>
               </a:rPr>
-              <a:t> declared</a:t>
+              <a:t>declared</a:t>
             </a:r>
           </a:p>
           <a:p>
@@ -22362,7 +22349,7 @@
             <a:r>
               <a:rPr lang="en-US" sz="2400" dirty="0">
                 <a:solidFill>
-                  <a:srgbClr val="65BB7B"/>
+                  <a:srgbClr val="5A5AA8"/>
                 </a:solidFill>
                 <a:latin typeface="Avenir" panose="02000503020000020003" pitchFamily="2" charset="0"/>
               </a:rPr>
@@ -22385,7 +22372,7 @@
             <a:r>
               <a:rPr lang="en-US" dirty="0">
                 <a:solidFill>
-                  <a:srgbClr val="65BB7B"/>
+                  <a:srgbClr val="5A5AA8"/>
                 </a:solidFill>
                 <a:latin typeface="Avenir Medium" panose="02000503020000020003" pitchFamily="2" charset="0"/>
               </a:rPr>
@@ -22446,20 +22433,11 @@
             <a:r>
               <a:rPr lang="en-US" dirty="0">
                 <a:solidFill>
-                  <a:srgbClr val="65BB7B"/>
-                </a:solidFill>
-                <a:latin typeface="Avenir Medium" panose="02000503020000020003" pitchFamily="2" charset="0"/>
-              </a:rPr>
-              <a:t>Cons</a:t>
-            </a:r>
-            <a:r>
-              <a:rPr lang="en-US" dirty="0">
-                <a:solidFill>
                   <a:srgbClr val="5A5AA8"/>
                 </a:solidFill>
                 <a:latin typeface="Avenir Medium" panose="02000503020000020003" pitchFamily="2" charset="0"/>
               </a:rPr>
-              <a:t> </a:t>
+              <a:t>Cons </a:t>
             </a:r>
           </a:p>
           <a:p>
@@ -26063,7 +26041,7 @@
             <a:r>
               <a:rPr lang="en-US" u="sng" dirty="0">
                 <a:solidFill>
-                  <a:srgbClr val="65BB7B"/>
+                  <a:srgbClr val="5A5AA8"/>
                 </a:solidFill>
                 <a:latin typeface="Avenir" panose="02000503020000020003" pitchFamily="2" charset="0"/>
               </a:rPr>
@@ -26072,7 +26050,7 @@
             <a:r>
               <a:rPr lang="en-US" dirty="0">
                 <a:solidFill>
-                  <a:srgbClr val="65BB7B"/>
+                  <a:srgbClr val="5A5AA8"/>
                 </a:solidFill>
                 <a:latin typeface="Avenir" panose="02000503020000020003" pitchFamily="2" charset="0"/>
               </a:rPr>
@@ -26087,7 +26065,7 @@
             <a:r>
               <a:rPr lang="en-US" dirty="0">
                 <a:solidFill>
-                  <a:srgbClr val="65BB7B"/>
+                  <a:srgbClr val="5A5AA8"/>
                 </a:solidFill>
                 <a:latin typeface="Avenir" panose="02000503020000020003" pitchFamily="2" charset="0"/>
               </a:rPr>
@@ -26109,7 +26087,7 @@
             <a:r>
               <a:rPr lang="en-US" dirty="0">
                 <a:solidFill>
-                  <a:srgbClr val="65BB7B"/>
+                  <a:srgbClr val="5A5AA8"/>
                 </a:solidFill>
                 <a:latin typeface="Avenir" panose="02000503020000020003" pitchFamily="2" charset="0"/>
               </a:rPr>
@@ -26135,7 +26113,7 @@
             <a:r>
               <a:rPr lang="en-US" dirty="0">
                 <a:solidFill>
-                  <a:srgbClr val="65BB7B"/>
+                  <a:srgbClr val="5A5AA8"/>
                 </a:solidFill>
                 <a:latin typeface="Avenir" panose="02000503020000020003" pitchFamily="2" charset="0"/>
               </a:rPr>
@@ -26163,7 +26141,7 @@
             <a:r>
               <a:rPr lang="en-US" dirty="0">
                 <a:solidFill>
-                  <a:srgbClr val="65BB7B"/>
+                  <a:srgbClr val="5A5AA8"/>
                 </a:solidFill>
                 <a:latin typeface="Avenir" panose="02000503020000020003" pitchFamily="2" charset="0"/>
               </a:rPr>
@@ -26200,7 +26178,7 @@
             <a:r>
               <a:rPr lang="en-US" dirty="0">
                 <a:solidFill>
-                  <a:srgbClr val="65BB7B"/>
+                  <a:srgbClr val="5A5AA8"/>
                 </a:solidFill>
                 <a:latin typeface="Avenir" panose="02000503020000020003" pitchFamily="2" charset="0"/>
               </a:rPr>
@@ -26228,7 +26206,7 @@
             <a:r>
               <a:rPr lang="en-US" dirty="0">
                 <a:solidFill>
-                  <a:srgbClr val="65BB7B"/>
+                  <a:srgbClr val="5A5AA8"/>
                 </a:solidFill>
                 <a:latin typeface="Avenir" panose="02000503020000020003" pitchFamily="2" charset="0"/>
               </a:rPr>
@@ -26251,27 +26229,16 @@
               <a:rPr lang="en-US" dirty="0">
                 <a:latin typeface="Avenir" panose="02000503020000020003" pitchFamily="2" charset="0"/>
               </a:rPr>
-              <a:t> Be </a:t>
+              <a:t> Be</a:t>
             </a:r>
             <a:r>
               <a:rPr lang="en-US" dirty="0">
                 <a:solidFill>
-                  <a:srgbClr val="65BB7B"/>
+                  <a:srgbClr val="5A5AA8"/>
                 </a:solidFill>
                 <a:latin typeface="Avenir" panose="02000503020000020003" pitchFamily="2" charset="0"/>
               </a:rPr>
-              <a:t>unique</a:t>
-            </a:r>
-            <a:r>
-              <a:rPr lang="en-US" dirty="0">
-                <a:solidFill>
-                  <a:schemeClr val="accent5">
-                    <a:lumMod val="75000"/>
-                  </a:schemeClr>
-                </a:solidFill>
-                <a:latin typeface="Avenir" panose="02000503020000020003" pitchFamily="2" charset="0"/>
-              </a:rPr>
-              <a:t> </a:t>
+              <a:t> unique </a:t>
             </a:r>
             <a:r>
               <a:rPr lang="en-US" dirty="0">
@@ -26306,22 +26273,11 @@
             <a:r>
               <a:rPr lang="en-US" dirty="0">
                 <a:solidFill>
-                  <a:srgbClr val="65BB7B"/>
+                  <a:srgbClr val="5A5AA8"/>
                 </a:solidFill>
                 <a:latin typeface="Avenir" panose="02000503020000020003" pitchFamily="2" charset="0"/>
               </a:rPr>
-              <a:t>79</a:t>
-            </a:r>
-            <a:r>
-              <a:rPr lang="en-US" dirty="0">
-                <a:solidFill>
-                  <a:schemeClr val="accent5">
-                    <a:lumMod val="75000"/>
-                  </a:schemeClr>
-                </a:solidFill>
-                <a:latin typeface="Avenir" panose="02000503020000020003" pitchFamily="2" charset="0"/>
-              </a:rPr>
-              <a:t> </a:t>
+              <a:t>79 </a:t>
             </a:r>
             <a:r>
               <a:rPr lang="en-US" dirty="0">
@@ -29577,7 +29533,7 @@
             <a:r>
               <a:rPr lang="en-US" dirty="0">
                 <a:solidFill>
-                  <a:srgbClr val="64BA7F"/>
+                  <a:srgbClr val="5A5AA8"/>
                 </a:solidFill>
                 <a:latin typeface="Avenir" panose="02000503020000020003" pitchFamily="2" charset="0"/>
               </a:rPr>
@@ -29605,7 +29561,7 @@
             <a:r>
               <a:rPr lang="en-US" dirty="0">
                 <a:solidFill>
-                  <a:srgbClr val="64BA7F"/>
+                  <a:srgbClr val="5A5AA8"/>
                 </a:solidFill>
                 <a:latin typeface="Avenir" panose="02000503020000020003" pitchFamily="2" charset="0"/>
               </a:rPr>
@@ -29620,7 +29576,7 @@
             <a:r>
               <a:rPr lang="en-US" dirty="0">
                 <a:solidFill>
-                  <a:srgbClr val="64BA7F"/>
+                  <a:srgbClr val="5A5AA8"/>
                 </a:solidFill>
                 <a:latin typeface="Avenir" panose="02000503020000020003" pitchFamily="2" charset="0"/>
               </a:rPr>
@@ -29648,7 +29604,7 @@
             <a:r>
               <a:rPr lang="en-US" dirty="0">
                 <a:solidFill>
-                  <a:srgbClr val="64BA7F"/>
+                  <a:srgbClr val="5A5AA8"/>
                 </a:solidFill>
                 <a:latin typeface="Avenir" panose="02000503020000020003" pitchFamily="2" charset="0"/>
               </a:rPr>
@@ -29663,7 +29619,7 @@
             <a:r>
               <a:rPr lang="en-US" dirty="0" err="1">
                 <a:solidFill>
-                  <a:srgbClr val="64BA7F"/>
+                  <a:srgbClr val="5A5AA8"/>
                 </a:solidFill>
                 <a:latin typeface="Avenir" panose="02000503020000020003" pitchFamily="2" charset="0"/>
               </a:rPr>
@@ -29681,7 +29637,7 @@
             <a:r>
               <a:rPr lang="en-US" dirty="0" err="1">
                 <a:solidFill>
-                  <a:srgbClr val="64BA7F"/>
+                  <a:srgbClr val="5A5AA8"/>
                 </a:solidFill>
                 <a:latin typeface="Avenir" panose="02000503020000020003" pitchFamily="2" charset="0"/>
               </a:rPr>
@@ -29723,7 +29679,7 @@
             <a:r>
               <a:rPr lang="en-US" dirty="0" err="1">
                 <a:solidFill>
-                  <a:srgbClr val="64BA7F"/>
+                  <a:srgbClr val="5A5AA8"/>
                 </a:solidFill>
                 <a:latin typeface="Avenir" panose="02000503020000020003" pitchFamily="2" charset="0"/>
               </a:rPr>
@@ -29741,7 +29697,7 @@
             <a:r>
               <a:rPr lang="en-US" dirty="0" err="1">
                 <a:solidFill>
-                  <a:srgbClr val="64BA7F"/>
+                  <a:srgbClr val="5A5AA8"/>
                 </a:solidFill>
                 <a:latin typeface="Avenir" panose="02000503020000020003" pitchFamily="2" charset="0"/>
               </a:rPr>
@@ -29780,7 +29736,7 @@
             <a:r>
               <a:rPr lang="en-US" dirty="0" err="1">
                 <a:solidFill>
-                  <a:srgbClr val="64BA7F"/>
+                  <a:srgbClr val="5A5AA8"/>
                 </a:solidFill>
                 <a:latin typeface="Avenir" panose="02000503020000020003" pitchFamily="2" charset="0"/>
               </a:rPr>
@@ -29795,7 +29751,7 @@
             <a:r>
               <a:rPr lang="en-US" dirty="0" err="1">
                 <a:solidFill>
-                  <a:srgbClr val="64BA7F"/>
+                  <a:srgbClr val="5A5AA8"/>
                 </a:solidFill>
                 <a:latin typeface="Avenir" panose="02000503020000020003" pitchFamily="2" charset="0"/>
               </a:rPr>
@@ -31823,7 +31779,7 @@
             <a:r>
               <a:rPr lang="en-US" sz="3600" b="1" dirty="0">
                 <a:solidFill>
-                  <a:srgbClr val="64BA7F"/>
+                  <a:srgbClr val="5A5AA8"/>
                 </a:solidFill>
                 <a:latin typeface="Avenir Black" panose="02000503020000020003" pitchFamily="2" charset="0"/>
               </a:rPr>
@@ -31854,7 +31810,7 @@
             <a:r>
               <a:rPr lang="en-US" sz="3600" b="1" dirty="0">
                 <a:solidFill>
-                  <a:srgbClr val="64BA7F"/>
+                  <a:srgbClr val="5A5AA8"/>
                 </a:solidFill>
                 <a:latin typeface="Avenir Black" panose="02000503020000020003" pitchFamily="2" charset="0"/>
               </a:rPr>
@@ -31885,7 +31841,7 @@
             <a:r>
               <a:rPr lang="en-US" b="1" dirty="0">
                 <a:solidFill>
-                  <a:srgbClr val="64BA7F"/>
+                  <a:srgbClr val="5A5AA8"/>
                 </a:solidFill>
                 <a:latin typeface="Avenir Black" panose="02000503020000020003" pitchFamily="2" charset="0"/>
               </a:rPr>
@@ -31907,7 +31863,7 @@
             <a:r>
               <a:rPr lang="en-US" b="1" dirty="0">
                 <a:solidFill>
-                  <a:srgbClr val="64BA7F"/>
+                  <a:srgbClr val="5A5AA8"/>
                 </a:solidFill>
                 <a:latin typeface="Avenir Black" panose="02000503020000020003" pitchFamily="2" charset="0"/>
               </a:rPr>
@@ -31945,11 +31901,20 @@
             <a:r>
               <a:rPr lang="en-US" b="1" dirty="0">
                 <a:solidFill>
+                  <a:srgbClr val="5A5AA8"/>
+                </a:solidFill>
+                <a:latin typeface="Avenir Black" panose="02000503020000020003" pitchFamily="2" charset="0"/>
+              </a:rPr>
+              <a:t>**</a:t>
+            </a:r>
+            <a:r>
+              <a:rPr lang="en-US" b="1" dirty="0">
+                <a:solidFill>
                   <a:srgbClr val="64BA7F"/>
                 </a:solidFill>
                 <a:latin typeface="Avenir Black" panose="02000503020000020003" pitchFamily="2" charset="0"/>
               </a:rPr>
-              <a:t>** </a:t>
+              <a:t> </a:t>
             </a:r>
             <a:r>
               <a:rPr lang="en-US" dirty="0">
@@ -31983,18 +31948,25 @@
           <a:p>
             <a:r>
               <a:rPr lang="en-US" dirty="0">
+                <a:latin typeface="Avenir" panose="02000503020000020003" pitchFamily="2" charset="0"/>
+                <a:cs typeface="Times New Roman" panose="02020603050405020304" pitchFamily="18" charset="0"/>
+              </a:rPr>
+              <a:t>Grouping    </a:t>
+            </a:r>
+            <a:r>
+              <a:rPr lang="en-US" dirty="0">
                 <a:solidFill>
-                  <a:schemeClr val="tx1"/>
+                  <a:srgbClr val="5A5AA8"/>
                 </a:solidFill>
                 <a:latin typeface="Avenir" panose="02000503020000020003" pitchFamily="2" charset="0"/>
                 <a:cs typeface="Times New Roman" panose="02020603050405020304" pitchFamily="18" charset="0"/>
               </a:rPr>
-              <a:t>Grouping             </a:t>
+              <a:t>         </a:t>
             </a:r>
             <a:r>
               <a:rPr lang="en-US" b="1" dirty="0">
                 <a:solidFill>
-                  <a:srgbClr val="64BA7F"/>
+                  <a:srgbClr val="5A5AA8"/>
                 </a:solidFill>
                 <a:latin typeface="Avenir Black" panose="02000503020000020003" pitchFamily="2" charset="0"/>
                 <a:cs typeface="Times New Roman" panose="02020603050405020304" pitchFamily="18" charset="0"/>
@@ -32025,7 +31997,7 @@
             <a:r>
               <a:rPr lang="en-US" b="1" dirty="0">
                 <a:solidFill>
-                  <a:srgbClr val="64BA7F"/>
+                  <a:srgbClr val="5A5AA8"/>
                 </a:solidFill>
                 <a:latin typeface="Avenir Black" panose="02000503020000020003" pitchFamily="2" charset="0"/>
                 <a:cs typeface="Times New Roman" panose="02020603050405020304" pitchFamily="18" charset="0"/>
@@ -32061,7 +32033,17 @@
                 <a:latin typeface="Avenir Black" panose="02000503020000020003" pitchFamily="2" charset="0"/>
                 <a:cs typeface="Times New Roman" panose="02020603050405020304" pitchFamily="18" charset="0"/>
               </a:rPr>
-              <a:t> %</a:t>
+              <a:t> </a:t>
+            </a:r>
+            <a:r>
+              <a:rPr lang="en-US" b="1" dirty="0">
+                <a:solidFill>
+                  <a:srgbClr val="5A5AA8"/>
+                </a:solidFill>
+                <a:latin typeface="Avenir Black" panose="02000503020000020003" pitchFamily="2" charset="0"/>
+                <a:cs typeface="Times New Roman" panose="02020603050405020304" pitchFamily="18" charset="0"/>
+              </a:rPr>
+              <a:t>%</a:t>
             </a:r>
             <a:r>
               <a:rPr lang="en-US" dirty="0">

</xml_diff>